<commit_message>
add page object desgin
</commit_message>
<xml_diff>
--- a/documents/Course 1-2.pptx
+++ b/documents/Course 1-2.pptx
@@ -34,6 +34,10 @@
     <p:sldId id="278" r:id="rId28"/>
     <p:sldId id="279" r:id="rId29"/>
     <p:sldId id="282" r:id="rId30"/>
+    <p:sldId id="286" r:id="rId31"/>
+    <p:sldId id="289" r:id="rId32"/>
+    <p:sldId id="287" r:id="rId33"/>
+    <p:sldId id="288" r:id="rId34"/>
   </p:sldIdLst>
   <p:sldSz cx="9144000" cy="6858000" type="screen4x3"/>
   <p:notesSz cx="6858000" cy="9144000"/>
@@ -375,7 +379,7 @@
           <a:p>
             <a:fld id="{225922D7-1ED3-904F-B321-F881A2B91019}" type="datetimeFigureOut">
               <a:rPr lang="en-US" smtClean="0"/>
-              <a:t>6/24/17</a:t>
+              <a:t>8/26/17</a:t>
             </a:fld>
             <a:endParaRPr lang="en-US"/>
           </a:p>
@@ -709,7 +713,7 @@
           <a:p>
             <a:fld id="{225922D7-1ED3-904F-B321-F881A2B91019}" type="datetimeFigureOut">
               <a:rPr lang="en-US" smtClean="0"/>
-              <a:t>6/24/17</a:t>
+              <a:t>8/26/17</a:t>
             </a:fld>
             <a:endParaRPr lang="en-US"/>
           </a:p>
@@ -948,7 +952,7 @@
           <a:p>
             <a:fld id="{225922D7-1ED3-904F-B321-F881A2B91019}" type="datetimeFigureOut">
               <a:rPr lang="en-US" smtClean="0"/>
-              <a:t>6/24/17</a:t>
+              <a:t>8/26/17</a:t>
             </a:fld>
             <a:endParaRPr lang="en-US"/>
           </a:p>
@@ -1248,7 +1252,7 @@
           <a:p>
             <a:fld id="{225922D7-1ED3-904F-B321-F881A2B91019}" type="datetimeFigureOut">
               <a:rPr lang="en-US" smtClean="0"/>
-              <a:t>6/24/17</a:t>
+              <a:t>8/26/17</a:t>
             </a:fld>
             <a:endParaRPr lang="en-US"/>
           </a:p>
@@ -1464,7 +1468,7 @@
           <a:p>
             <a:fld id="{225922D7-1ED3-904F-B321-F881A2B91019}" type="datetimeFigureOut">
               <a:rPr lang="en-US" smtClean="0"/>
-              <a:t>6/24/17</a:t>
+              <a:t>8/26/17</a:t>
             </a:fld>
             <a:endParaRPr lang="en-US"/>
           </a:p>
@@ -1824,7 +1828,7 @@
           <a:p>
             <a:fld id="{225922D7-1ED3-904F-B321-F881A2B91019}" type="datetimeFigureOut">
               <a:rPr lang="en-US" smtClean="0"/>
-              <a:t>6/24/17</a:t>
+              <a:t>8/26/17</a:t>
             </a:fld>
             <a:endParaRPr lang="en-US"/>
           </a:p>
@@ -2091,7 +2095,7 @@
           <a:p>
             <a:fld id="{225922D7-1ED3-904F-B321-F881A2B91019}" type="datetimeFigureOut">
               <a:rPr lang="en-US" smtClean="0"/>
-              <a:t>6/24/17</a:t>
+              <a:t>8/26/17</a:t>
             </a:fld>
             <a:endParaRPr lang="en-US"/>
           </a:p>
@@ -2181,7 +2185,7 @@
           <a:p>
             <a:fld id="{225922D7-1ED3-904F-B321-F881A2B91019}" type="datetimeFigureOut">
               <a:rPr lang="en-US" smtClean="0"/>
-              <a:t>6/24/17</a:t>
+              <a:t>8/26/17</a:t>
             </a:fld>
             <a:endParaRPr lang="en-US"/>
           </a:p>
@@ -2482,7 +2486,7 @@
           <a:p>
             <a:fld id="{225922D7-1ED3-904F-B321-F881A2B91019}" type="datetimeFigureOut">
               <a:rPr lang="en-US" smtClean="0"/>
-              <a:t>6/24/17</a:t>
+              <a:t>8/26/17</a:t>
             </a:fld>
             <a:endParaRPr lang="en-US"/>
           </a:p>
@@ -2788,7 +2792,7 @@
           <a:p>
             <a:fld id="{225922D7-1ED3-904F-B321-F881A2B91019}" type="datetimeFigureOut">
               <a:rPr lang="en-US" smtClean="0"/>
-              <a:t>6/24/17</a:t>
+              <a:t>8/26/17</a:t>
             </a:fld>
             <a:endParaRPr lang="en-US"/>
           </a:p>
@@ -3068,7 +3072,7 @@
           <a:p>
             <a:fld id="{225922D7-1ED3-904F-B321-F881A2B91019}" type="datetimeFigureOut">
               <a:rPr lang="en-US" smtClean="0"/>
-              <a:t>6/24/17</a:t>
+              <a:t>8/26/17</a:t>
             </a:fld>
             <a:endParaRPr lang="en-US"/>
           </a:p>
@@ -3476,7 +3480,7 @@
           <a:p>
             <a:fld id="{225922D7-1ED3-904F-B321-F881A2B91019}" type="datetimeFigureOut">
               <a:rPr lang="en-US" smtClean="0"/>
-              <a:t>6/24/17</a:t>
+              <a:t>8/26/17</a:t>
             </a:fld>
             <a:endParaRPr lang="en-US"/>
           </a:p>
@@ -4036,7 +4040,7 @@
           <a:p>
             <a:fld id="{225922D7-1ED3-904F-B321-F881A2B91019}" type="datetimeFigureOut">
               <a:rPr lang="en-US" smtClean="0"/>
-              <a:t>6/24/17</a:t>
+              <a:t>8/26/17</a:t>
             </a:fld>
             <a:endParaRPr lang="en-US"/>
           </a:p>
@@ -4184,7 +4188,7 @@
           <a:p>
             <a:fld id="{225922D7-1ED3-904F-B321-F881A2B91019}" type="datetimeFigureOut">
               <a:rPr lang="en-US" smtClean="0"/>
-              <a:t>6/24/17</a:t>
+              <a:t>8/26/17</a:t>
             </a:fld>
             <a:endParaRPr lang="en-US"/>
           </a:p>
@@ -4274,7 +4278,7 @@
           <a:p>
             <a:fld id="{225922D7-1ED3-904F-B321-F881A2B91019}" type="datetimeFigureOut">
               <a:rPr lang="en-US" smtClean="0"/>
-              <a:t>6/24/17</a:t>
+              <a:t>8/26/17</a:t>
             </a:fld>
             <a:endParaRPr lang="en-US"/>
           </a:p>
@@ -4616,7 +4620,7 @@
           <a:p>
             <a:fld id="{225922D7-1ED3-904F-B321-F881A2B91019}" type="datetimeFigureOut">
               <a:rPr lang="en-US" smtClean="0"/>
-              <a:t>6/24/17</a:t>
+              <a:t>8/26/17</a:t>
             </a:fld>
             <a:endParaRPr lang="en-US"/>
           </a:p>
@@ -4825,7 +4829,7 @@
           <a:p>
             <a:fld id="{225922D7-1ED3-904F-B321-F881A2B91019}" type="datetimeFigureOut">
               <a:rPr lang="en-US" smtClean="0"/>
-              <a:t>6/24/17</a:t>
+              <a:t>8/26/17</a:t>
             </a:fld>
             <a:endParaRPr lang="en-US"/>
           </a:p>
@@ -9448,6 +9452,493 @@
 </p:sld>
 </file>
 
+<file path=ppt/slides/slide30.xml><?xml version="1.0" encoding="utf-8"?>
+<p:sld xmlns:a="http://schemas.openxmlformats.org/drawingml/2006/main" xmlns:r="http://schemas.openxmlformats.org/officeDocument/2006/relationships" xmlns:p="http://schemas.openxmlformats.org/presentationml/2006/main">
+  <p:cSld>
+    <p:spTree>
+      <p:nvGrpSpPr>
+        <p:cNvPr id="1" name=""/>
+        <p:cNvGrpSpPr/>
+        <p:nvPr/>
+      </p:nvGrpSpPr>
+      <p:grpSpPr>
+        <a:xfrm>
+          <a:off x="0" y="0"/>
+          <a:ext cx="0" cy="0"/>
+          <a:chOff x="0" y="0"/>
+          <a:chExt cx="0" cy="0"/>
+        </a:xfrm>
+      </p:grpSpPr>
+      <p:sp>
+        <p:nvSpPr>
+          <p:cNvPr id="2" name="Title 1"/>
+          <p:cNvSpPr>
+            <a:spLocks noGrp="1"/>
+          </p:cNvSpPr>
+          <p:nvPr>
+            <p:ph type="title"/>
+          </p:nvPr>
+        </p:nvSpPr>
+        <p:spPr/>
+        <p:txBody>
+          <a:bodyPr/>
+          <a:lstStyle/>
+          <a:p>
+            <a:r>
+              <a:rPr lang="en-US" dirty="0"/>
+              <a:t>Page Object </a:t>
+            </a:r>
+            <a:r>
+              <a:rPr lang="en-US" dirty="0" smtClean="0"/>
+              <a:t>Pattern</a:t>
+            </a:r>
+            <a:endParaRPr lang="en-US" dirty="0"/>
+          </a:p>
+        </p:txBody>
+      </p:sp>
+      <p:sp>
+        <p:nvSpPr>
+          <p:cNvPr id="3" name="Content Placeholder 2"/>
+          <p:cNvSpPr>
+            <a:spLocks noGrp="1"/>
+          </p:cNvSpPr>
+          <p:nvPr>
+            <p:ph idx="1"/>
+          </p:nvPr>
+        </p:nvSpPr>
+        <p:spPr/>
+        <p:txBody>
+          <a:bodyPr>
+            <a:normAutofit/>
+          </a:bodyPr>
+          <a:lstStyle/>
+          <a:p>
+            <a:r>
+              <a:rPr lang="en-US" altLang="x-none" dirty="0"/>
+              <a:t>Adds a layer of abstraction into your code.</a:t>
+            </a:r>
+          </a:p>
+          <a:p>
+            <a:r>
+              <a:rPr lang="en-US" altLang="x-none" dirty="0"/>
+              <a:t>Helps to organize your code once it grows large.</a:t>
+            </a:r>
+          </a:p>
+          <a:p>
+            <a:r>
+              <a:rPr lang="en-US" altLang="x-none" dirty="0"/>
+              <a:t>All automation is automatically reusable and shareable.  </a:t>
+            </a:r>
+          </a:p>
+          <a:p>
+            <a:r>
+              <a:rPr lang="en-US" altLang="x-none" dirty="0"/>
+              <a:t>A way to separate tests from re-usable functions.</a:t>
+            </a:r>
+          </a:p>
+          <a:p>
+            <a:r>
+              <a:rPr lang="en-US" altLang="x-none" dirty="0"/>
+              <a:t>A way to store information about how the system works.  </a:t>
+            </a:r>
+          </a:p>
+        </p:txBody>
+      </p:sp>
+    </p:spTree>
+    <p:extLst>
+      <p:ext uri="{BB962C8B-B14F-4D97-AF65-F5344CB8AC3E}">
+        <p14:creationId xmlns:p14="http://schemas.microsoft.com/office/powerpoint/2010/main" val="2086037255"/>
+      </p:ext>
+    </p:extLst>
+  </p:cSld>
+  <p:clrMapOvr>
+    <a:masterClrMapping/>
+  </p:clrMapOvr>
+</p:sld>
+</file>
+
+<file path=ppt/slides/slide31.xml><?xml version="1.0" encoding="utf-8"?>
+<p:sld xmlns:a="http://schemas.openxmlformats.org/drawingml/2006/main" xmlns:r="http://schemas.openxmlformats.org/officeDocument/2006/relationships" xmlns:p="http://schemas.openxmlformats.org/presentationml/2006/main">
+  <p:cSld>
+    <p:spTree>
+      <p:nvGrpSpPr>
+        <p:cNvPr id="1" name=""/>
+        <p:cNvGrpSpPr/>
+        <p:nvPr/>
+      </p:nvGrpSpPr>
+      <p:grpSpPr>
+        <a:xfrm>
+          <a:off x="0" y="0"/>
+          <a:ext cx="0" cy="0"/>
+          <a:chOff x="0" y="0"/>
+          <a:chExt cx="0" cy="0"/>
+        </a:xfrm>
+      </p:grpSpPr>
+      <p:sp>
+        <p:nvSpPr>
+          <p:cNvPr id="2" name="Title 1"/>
+          <p:cNvSpPr>
+            <a:spLocks noGrp="1"/>
+          </p:cNvSpPr>
+          <p:nvPr>
+            <p:ph type="title"/>
+          </p:nvPr>
+        </p:nvSpPr>
+        <p:spPr/>
+        <p:txBody>
+          <a:bodyPr/>
+          <a:lstStyle/>
+          <a:p>
+            <a:endParaRPr lang="en-US"/>
+          </a:p>
+        </p:txBody>
+      </p:sp>
+      <p:sp>
+        <p:nvSpPr>
+          <p:cNvPr id="3" name="Content Placeholder 2"/>
+          <p:cNvSpPr>
+            <a:spLocks noGrp="1"/>
+          </p:cNvSpPr>
+          <p:nvPr>
+            <p:ph idx="1"/>
+          </p:nvPr>
+        </p:nvSpPr>
+        <p:spPr/>
+        <p:txBody>
+          <a:bodyPr/>
+          <a:lstStyle/>
+          <a:p>
+            <a:r>
+              <a:rPr lang="en-US" altLang="x-none" dirty="0"/>
+              <a:t>A way to specify what page functions start on, and what page they end on.  </a:t>
+            </a:r>
+          </a:p>
+          <a:p>
+            <a:r>
+              <a:rPr lang="en-US" altLang="x-none" dirty="0"/>
+              <a:t>A way to programmatically break your tests when functionality changes.</a:t>
+            </a:r>
+          </a:p>
+          <a:p>
+            <a:r>
+              <a:rPr lang="en-US" altLang="x-none" dirty="0"/>
+              <a:t>Makes code maintenance easier.</a:t>
+            </a:r>
+          </a:p>
+          <a:p>
+            <a:r>
+              <a:rPr lang="en-US" altLang="x-none" dirty="0"/>
+              <a:t>There is even a </a:t>
+            </a:r>
+            <a:r>
+              <a:rPr lang="en-US" altLang="x-none" dirty="0" err="1"/>
+              <a:t>PageFactory</a:t>
+            </a:r>
+            <a:r>
+              <a:rPr lang="en-US" altLang="x-none" dirty="0"/>
+              <a:t> class available to automatically create </a:t>
+            </a:r>
+            <a:r>
+              <a:rPr lang="en-US" altLang="x-none" dirty="0" smtClean="0"/>
+              <a:t>them</a:t>
+            </a:r>
+            <a:endParaRPr lang="en-US" dirty="0"/>
+          </a:p>
+        </p:txBody>
+      </p:sp>
+    </p:spTree>
+    <p:extLst>
+      <p:ext uri="{BB962C8B-B14F-4D97-AF65-F5344CB8AC3E}">
+        <p14:creationId xmlns:p14="http://schemas.microsoft.com/office/powerpoint/2010/main" val="1154424740"/>
+      </p:ext>
+    </p:extLst>
+  </p:cSld>
+  <p:clrMapOvr>
+    <a:masterClrMapping/>
+  </p:clrMapOvr>
+</p:sld>
+</file>
+
+<file path=ppt/slides/slide32.xml><?xml version="1.0" encoding="utf-8"?>
+<p:sld xmlns:a="http://schemas.openxmlformats.org/drawingml/2006/main" xmlns:r="http://schemas.openxmlformats.org/officeDocument/2006/relationships" xmlns:p="http://schemas.openxmlformats.org/presentationml/2006/main">
+  <p:cSld>
+    <p:spTree>
+      <p:nvGrpSpPr>
+        <p:cNvPr id="1" name=""/>
+        <p:cNvGrpSpPr/>
+        <p:nvPr/>
+      </p:nvGrpSpPr>
+      <p:grpSpPr>
+        <a:xfrm>
+          <a:off x="0" y="0"/>
+          <a:ext cx="0" cy="0"/>
+          <a:chOff x="0" y="0"/>
+          <a:chExt cx="0" cy="0"/>
+        </a:xfrm>
+      </p:grpSpPr>
+      <p:sp>
+        <p:nvSpPr>
+          <p:cNvPr id="2" name="Title 1"/>
+          <p:cNvSpPr>
+            <a:spLocks noGrp="1"/>
+          </p:cNvSpPr>
+          <p:nvPr>
+            <p:ph type="title"/>
+          </p:nvPr>
+        </p:nvSpPr>
+        <p:spPr/>
+        <p:txBody>
+          <a:bodyPr/>
+          <a:lstStyle/>
+          <a:p>
+            <a:r>
+              <a:rPr lang="en-US" dirty="0"/>
+              <a:t>How does it work?</a:t>
+            </a:r>
+          </a:p>
+        </p:txBody>
+      </p:sp>
+      <p:sp>
+        <p:nvSpPr>
+          <p:cNvPr id="3" name="Content Placeholder 2"/>
+          <p:cNvSpPr>
+            <a:spLocks noGrp="1"/>
+          </p:cNvSpPr>
+          <p:nvPr>
+            <p:ph idx="1"/>
+          </p:nvPr>
+        </p:nvSpPr>
+        <p:spPr/>
+        <p:txBody>
+          <a:bodyPr>
+            <a:normAutofit fontScale="92500" lnSpcReduction="10000"/>
+          </a:bodyPr>
+          <a:lstStyle/>
+          <a:p>
+            <a:pPr>
+              <a:buFont typeface="Wingdings 2"/>
+              <a:buChar char=""/>
+              <a:defRPr/>
+            </a:pPr>
+            <a:r>
+              <a:rPr lang="en-US" dirty="0"/>
+              <a:t>Each page is defined as it’s own class.</a:t>
+            </a:r>
+          </a:p>
+          <a:p>
+            <a:pPr>
+              <a:buFont typeface="Wingdings 2"/>
+              <a:buChar char=""/>
+              <a:defRPr/>
+            </a:pPr>
+            <a:r>
+              <a:rPr lang="en-US" dirty="0"/>
+              <a:t>Actions (including navigation) are represented as functions for a class.</a:t>
+            </a:r>
+          </a:p>
+          <a:p>
+            <a:pPr>
+              <a:buFont typeface="Wingdings 2"/>
+              <a:buChar char=""/>
+              <a:defRPr/>
+            </a:pPr>
+            <a:r>
+              <a:rPr lang="en-US" dirty="0"/>
+              <a:t>Each function returns a new Page object, signifying what page the actions stops on.</a:t>
+            </a:r>
+          </a:p>
+          <a:p>
+            <a:pPr>
+              <a:buFont typeface="Wingdings 2"/>
+              <a:buChar char=""/>
+              <a:defRPr/>
+            </a:pPr>
+            <a:r>
+              <a:rPr lang="en-US" dirty="0"/>
+              <a:t>Your tests “know” what page you are on, and will only give you access to functions available to that class.</a:t>
+            </a:r>
+          </a:p>
+          <a:p>
+            <a:pPr>
+              <a:buFont typeface="Wingdings 2"/>
+              <a:buChar char=""/>
+              <a:defRPr/>
+            </a:pPr>
+            <a:r>
+              <a:rPr lang="en-US" dirty="0"/>
+              <a:t>Tests only talk to the page objects.</a:t>
+            </a:r>
+          </a:p>
+          <a:p>
+            <a:pPr>
+              <a:buFont typeface="Wingdings 2"/>
+              <a:buChar char=""/>
+              <a:defRPr/>
+            </a:pPr>
+            <a:r>
+              <a:rPr lang="en-US" dirty="0"/>
+              <a:t>Page objects only talk to the driver</a:t>
+            </a:r>
+            <a:r>
+              <a:rPr lang="en-US" dirty="0" smtClean="0"/>
+              <a:t>.</a:t>
+            </a:r>
+            <a:endParaRPr lang="en-US" dirty="0"/>
+          </a:p>
+        </p:txBody>
+      </p:sp>
+    </p:spTree>
+    <p:extLst>
+      <p:ext uri="{BB962C8B-B14F-4D97-AF65-F5344CB8AC3E}">
+        <p14:creationId xmlns:p14="http://schemas.microsoft.com/office/powerpoint/2010/main" val="2053701388"/>
+      </p:ext>
+    </p:extLst>
+  </p:cSld>
+  <p:clrMapOvr>
+    <a:masterClrMapping/>
+  </p:clrMapOvr>
+</p:sld>
+</file>
+
+<file path=ppt/slides/slide33.xml><?xml version="1.0" encoding="utf-8"?>
+<p:sld xmlns:a="http://schemas.openxmlformats.org/drawingml/2006/main" xmlns:r="http://schemas.openxmlformats.org/officeDocument/2006/relationships" xmlns:p="http://schemas.openxmlformats.org/presentationml/2006/main">
+  <p:cSld>
+    <p:spTree>
+      <p:nvGrpSpPr>
+        <p:cNvPr id="1" name=""/>
+        <p:cNvGrpSpPr/>
+        <p:nvPr/>
+      </p:nvGrpSpPr>
+      <p:grpSpPr>
+        <a:xfrm>
+          <a:off x="0" y="0"/>
+          <a:ext cx="0" cy="0"/>
+          <a:chOff x="0" y="0"/>
+          <a:chExt cx="0" cy="0"/>
+        </a:xfrm>
+      </p:grpSpPr>
+      <p:sp>
+        <p:nvSpPr>
+          <p:cNvPr id="2" name="Title 1"/>
+          <p:cNvSpPr>
+            <a:spLocks noGrp="1"/>
+          </p:cNvSpPr>
+          <p:nvPr>
+            <p:ph type="title"/>
+          </p:nvPr>
+        </p:nvSpPr>
+        <p:spPr/>
+        <p:txBody>
+          <a:bodyPr/>
+          <a:lstStyle/>
+          <a:p>
+            <a:endParaRPr lang="en-US"/>
+          </a:p>
+        </p:txBody>
+      </p:sp>
+      <p:sp>
+        <p:nvSpPr>
+          <p:cNvPr id="3" name="Content Placeholder 2"/>
+          <p:cNvSpPr>
+            <a:spLocks noGrp="1"/>
+          </p:cNvSpPr>
+          <p:nvPr>
+            <p:ph idx="1"/>
+          </p:nvPr>
+        </p:nvSpPr>
+        <p:spPr/>
+        <p:txBody>
+          <a:bodyPr>
+            <a:normAutofit fontScale="92500" lnSpcReduction="10000"/>
+          </a:bodyPr>
+          <a:lstStyle/>
+          <a:p>
+            <a:pPr>
+              <a:buFont typeface="Wingdings 2"/>
+              <a:buChar char=""/>
+              <a:defRPr/>
+            </a:pPr>
+            <a:r>
+              <a:rPr lang="en-US" dirty="0"/>
+              <a:t>Elements on the page are stored as variables for the page object.  </a:t>
+            </a:r>
+          </a:p>
+          <a:p>
+            <a:pPr>
+              <a:buFont typeface="Wingdings 2"/>
+              <a:buChar char=""/>
+              <a:defRPr/>
+            </a:pPr>
+            <a:r>
+              <a:rPr lang="en-US" dirty="0"/>
+              <a:t>Automatic page validations can be stored in the constructor for each page object.  </a:t>
+            </a:r>
+          </a:p>
+          <a:p>
+            <a:pPr>
+              <a:buFont typeface="Wingdings 2"/>
+              <a:buChar char=""/>
+              <a:defRPr/>
+            </a:pPr>
+            <a:r>
+              <a:rPr lang="en-US" dirty="0"/>
+              <a:t>Tests become a string of well defined functions, not meaningless gibberish. </a:t>
+            </a:r>
+          </a:p>
+          <a:p>
+            <a:pPr>
+              <a:buFont typeface="Wingdings 2"/>
+              <a:buChar char=""/>
+              <a:defRPr/>
+            </a:pPr>
+            <a:r>
+              <a:rPr lang="en-US" dirty="0"/>
+              <a:t>Tests can be grouped by namespace.</a:t>
+            </a:r>
+          </a:p>
+          <a:p>
+            <a:pPr>
+              <a:buFont typeface="Wingdings 2"/>
+              <a:buChar char=""/>
+              <a:defRPr/>
+            </a:pPr>
+            <a:r>
+              <a:rPr lang="en-US" dirty="0"/>
+              <a:t>Class Inheritance can be used to define functionality to a set of pages.</a:t>
+            </a:r>
+          </a:p>
+          <a:p>
+            <a:pPr>
+              <a:buFont typeface="Wingdings 2"/>
+              <a:buChar char=""/>
+              <a:defRPr/>
+            </a:pPr>
+            <a:r>
+              <a:rPr lang="en-US" dirty="0"/>
+              <a:t>We can make functional logic transparent to the tests by returning different inherited classes.</a:t>
+            </a:r>
+          </a:p>
+          <a:p>
+            <a:endParaRPr lang="en-US" dirty="0"/>
+          </a:p>
+          <a:p>
+            <a:endParaRPr lang="en-US" dirty="0"/>
+          </a:p>
+        </p:txBody>
+      </p:sp>
+    </p:spTree>
+    <p:extLst>
+      <p:ext uri="{BB962C8B-B14F-4D97-AF65-F5344CB8AC3E}">
+        <p14:creationId xmlns:p14="http://schemas.microsoft.com/office/powerpoint/2010/main" val="54569885"/>
+      </p:ext>
+    </p:extLst>
+  </p:cSld>
+  <p:clrMapOvr>
+    <a:masterClrMapping/>
+  </p:clrMapOvr>
+</p:sld>
+</file>
+
 <file path=ppt/slides/slide4.xml><?xml version="1.0" encoding="utf-8"?>
 <p:sld xmlns:a="http://schemas.openxmlformats.org/drawingml/2006/main" xmlns:r="http://schemas.openxmlformats.org/officeDocument/2006/relationships" xmlns:p="http://schemas.openxmlformats.org/presentationml/2006/main">
   <p:cSld>

</xml_diff>